<commit_message>
reformat chapter 8 + 9
</commit_message>
<xml_diff>
--- a/slides/Chapter6.pptx
+++ b/slides/Chapter6.pptx
@@ -220,7 +220,7 @@
           <a:p>
             <a:fld id="{D2A48B96-639E-45A3-A0BA-2464DFDB1FAA}" type="datetimeFigureOut">
               <a:rPr lang="zh-CN" altLang="en-US" smtClean="0"/>
-              <a:t>2022/12/30</a:t>
+              <a:t>2023/1/7</a:t>
             </a:fld>
             <a:endParaRPr lang="zh-CN" altLang="en-US"/>
           </a:p>
@@ -1457,7 +1457,7 @@
           <a:p>
             <a:fld id="{D997B5FA-0921-464F-AAE1-844C04324D75}" type="datetimeFigureOut">
               <a:rPr lang="zh-CN" altLang="en-US" smtClean="0"/>
-              <a:t>2022/12/30</a:t>
+              <a:t>2023/1/7</a:t>
             </a:fld>
             <a:endParaRPr lang="zh-CN" altLang="en-US"/>
           </a:p>
@@ -1620,7 +1620,7 @@
           <a:p>
             <a:fld id="{D997B5FA-0921-464F-AAE1-844C04324D75}" type="datetimeFigureOut">
               <a:rPr lang="zh-CN" altLang="en-US" smtClean="0"/>
-              <a:t>2022/12/30</a:t>
+              <a:t>2023/1/7</a:t>
             </a:fld>
             <a:endParaRPr lang="zh-CN" altLang="en-US"/>
           </a:p>
@@ -1793,7 +1793,7 @@
           <a:p>
             <a:fld id="{D997B5FA-0921-464F-AAE1-844C04324D75}" type="datetimeFigureOut">
               <a:rPr lang="zh-CN" altLang="en-US" smtClean="0"/>
-              <a:t>2022/12/30</a:t>
+              <a:t>2023/1/7</a:t>
             </a:fld>
             <a:endParaRPr lang="zh-CN" altLang="en-US"/>
           </a:p>
@@ -2467,7 +2467,7 @@
           <a:p>
             <a:fld id="{760FBDFE-C587-4B4C-A407-44438C67B59E}" type="datetimeFigureOut">
               <a:rPr lang="zh-CN" altLang="en-US" smtClean="0"/>
-              <a:t>2022/12/30</a:t>
+              <a:t>2023/1/7</a:t>
             </a:fld>
             <a:endParaRPr lang="zh-CN" altLang="en-US"/>
           </a:p>
@@ -3335,7 +3335,7 @@
           <a:p>
             <a:fld id="{760FBDFE-C587-4B4C-A407-44438C67B59E}" type="datetimeFigureOut">
               <a:rPr lang="zh-CN" altLang="en-US" smtClean="0"/>
-              <a:t>2022/12/30</a:t>
+              <a:t>2023/1/7</a:t>
             </a:fld>
             <a:endParaRPr lang="zh-CN" altLang="en-US"/>
           </a:p>
@@ -4143,7 +4143,7 @@
           <a:p>
             <a:fld id="{760FBDFE-C587-4B4C-A407-44438C67B59E}" type="datetimeFigureOut">
               <a:rPr lang="zh-CN" altLang="en-US" smtClean="0"/>
-              <a:t>2022/12/30</a:t>
+              <a:t>2023/1/7</a:t>
             </a:fld>
             <a:endParaRPr lang="zh-CN" altLang="en-US"/>
           </a:p>
@@ -4880,7 +4880,7 @@
           <a:p>
             <a:fld id="{760FBDFE-C587-4B4C-A407-44438C67B59E}" type="datetimeFigureOut">
               <a:rPr lang="zh-CN" altLang="en-US" smtClean="0"/>
-              <a:t>2022/12/30</a:t>
+              <a:t>2023/1/7</a:t>
             </a:fld>
             <a:endParaRPr lang="zh-CN" altLang="en-US"/>
           </a:p>
@@ -5861,7 +5861,7 @@
           <a:p>
             <a:fld id="{760FBDFE-C587-4B4C-A407-44438C67B59E}" type="datetimeFigureOut">
               <a:rPr lang="zh-CN" altLang="en-US" smtClean="0"/>
-              <a:t>2022/12/30</a:t>
+              <a:t>2023/1/7</a:t>
             </a:fld>
             <a:endParaRPr lang="zh-CN" altLang="en-US"/>
           </a:p>
@@ -6484,7 +6484,7 @@
           <a:p>
             <a:fld id="{760FBDFE-C587-4B4C-A407-44438C67B59E}" type="datetimeFigureOut">
               <a:rPr lang="zh-CN" altLang="en-US" smtClean="0"/>
-              <a:t>2022/12/30</a:t>
+              <a:t>2023/1/7</a:t>
             </a:fld>
             <a:endParaRPr lang="zh-CN" altLang="en-US"/>
           </a:p>
@@ -6591,7 +6591,7 @@
           <a:p>
             <a:fld id="{760FBDFE-C587-4B4C-A407-44438C67B59E}" type="datetimeFigureOut">
               <a:rPr lang="zh-CN" altLang="en-US" smtClean="0"/>
-              <a:t>2022/12/30</a:t>
+              <a:t>2023/1/7</a:t>
             </a:fld>
             <a:endParaRPr lang="zh-CN" altLang="en-US"/>
           </a:p>
@@ -7217,7 +7217,7 @@
           <a:p>
             <a:fld id="{9EFD9D74-47D9-4702-A33C-335B63B48DBF}" type="datetimeFigureOut">
               <a:rPr lang="zh-CN" altLang="en-US" smtClean="0"/>
-              <a:t>2022/12/30</a:t>
+              <a:t>2023/1/7</a:t>
             </a:fld>
             <a:endParaRPr lang="zh-CN" altLang="en-US" dirty="0"/>
           </a:p>
@@ -7412,7 +7412,7 @@
           <a:p>
             <a:fld id="{D997B5FA-0921-464F-AAE1-844C04324D75}" type="datetimeFigureOut">
               <a:rPr lang="zh-CN" altLang="en-US" smtClean="0"/>
-              <a:t>2022/12/30</a:t>
+              <a:t>2023/1/7</a:t>
             </a:fld>
             <a:endParaRPr lang="zh-CN" altLang="en-US"/>
           </a:p>
@@ -8094,7 +8094,7 @@
           <a:p>
             <a:fld id="{760FBDFE-C587-4B4C-A407-44438C67B59E}" type="datetimeFigureOut">
               <a:rPr lang="zh-CN" altLang="en-US" smtClean="0"/>
-              <a:t>2022/12/30</a:t>
+              <a:t>2023/1/7</a:t>
             </a:fld>
             <a:endParaRPr lang="zh-CN" altLang="en-US"/>
           </a:p>
@@ -8630,7 +8630,7 @@
           <a:p>
             <a:fld id="{760FBDFE-C587-4B4C-A407-44438C67B59E}" type="datetimeFigureOut">
               <a:rPr lang="zh-CN" altLang="en-US" smtClean="0"/>
-              <a:t>2022/12/30</a:t>
+              <a:t>2023/1/7</a:t>
             </a:fld>
             <a:endParaRPr lang="zh-CN" altLang="en-US"/>
           </a:p>
@@ -9397,7 +9397,7 @@
           <a:p>
             <a:fld id="{760FBDFE-C587-4B4C-A407-44438C67B59E}" type="datetimeFigureOut">
               <a:rPr lang="zh-CN" altLang="en-US" smtClean="0"/>
-              <a:t>2022/12/30</a:t>
+              <a:t>2023/1/7</a:t>
             </a:fld>
             <a:endParaRPr lang="zh-CN" altLang="en-US"/>
           </a:p>
@@ -9863,7 +9863,7 @@
           <a:p>
             <a:fld id="{760FBDFE-C587-4B4C-A407-44438C67B59E}" type="datetimeFigureOut">
               <a:rPr lang="zh-CN" altLang="en-US" smtClean="0"/>
-              <a:t>2022/12/30</a:t>
+              <a:t>2023/1/7</a:t>
             </a:fld>
             <a:endParaRPr lang="zh-CN" altLang="en-US"/>
           </a:p>
@@ -10553,7 +10553,7 @@
           <a:p>
             <a:fld id="{760FBDFE-C587-4B4C-A407-44438C67B59E}" type="datetimeFigureOut">
               <a:rPr lang="zh-CN" altLang="en-US" smtClean="0"/>
-              <a:t>2022/12/30</a:t>
+              <a:t>2023/1/7</a:t>
             </a:fld>
             <a:endParaRPr lang="zh-CN" altLang="en-US"/>
           </a:p>
@@ -11027,7 +11027,7 @@
           <a:p>
             <a:fld id="{760FBDFE-C587-4B4C-A407-44438C67B59E}" type="datetimeFigureOut">
               <a:rPr lang="zh-CN" altLang="en-US" smtClean="0"/>
-              <a:t>2022/12/30</a:t>
+              <a:t>2023/1/7</a:t>
             </a:fld>
             <a:endParaRPr lang="zh-CN" altLang="en-US" dirty="0"/>
           </a:p>
@@ -11753,7 +11753,7 @@
           <a:p>
             <a:fld id="{760FBDFE-C587-4B4C-A407-44438C67B59E}" type="datetimeFigureOut">
               <a:rPr lang="zh-CN" altLang="en-US" smtClean="0"/>
-              <a:t>2022/12/30</a:t>
+              <a:t>2023/1/7</a:t>
             </a:fld>
             <a:endParaRPr lang="zh-CN" altLang="en-US"/>
           </a:p>
@@ -12393,7 +12393,7 @@
           <a:p>
             <a:fld id="{760FBDFE-C587-4B4C-A407-44438C67B59E}" type="datetimeFigureOut">
               <a:rPr lang="zh-CN" altLang="en-US" smtClean="0"/>
-              <a:t>2022/12/30</a:t>
+              <a:t>2023/1/7</a:t>
             </a:fld>
             <a:endParaRPr lang="zh-CN" altLang="en-US"/>
           </a:p>
@@ -12820,7 +12820,7 @@
           <a:p>
             <a:fld id="{760FBDFE-C587-4B4C-A407-44438C67B59E}" type="datetimeFigureOut">
               <a:rPr lang="zh-CN" altLang="en-US" smtClean="0"/>
-              <a:t>2022/12/30</a:t>
+              <a:t>2023/1/7</a:t>
             </a:fld>
             <a:endParaRPr lang="zh-CN" altLang="en-US"/>
           </a:p>
@@ -14020,7 +14020,7 @@
           <a:p>
             <a:fld id="{760FBDFE-C587-4B4C-A407-44438C67B59E}" type="datetimeFigureOut">
               <a:rPr lang="zh-CN" altLang="en-US" smtClean="0"/>
-              <a:t>2022/12/30</a:t>
+              <a:t>2023/1/7</a:t>
             </a:fld>
             <a:endParaRPr lang="zh-CN" altLang="en-US"/>
           </a:p>
@@ -14339,7 +14339,7 @@
           <a:p>
             <a:fld id="{D997B5FA-0921-464F-AAE1-844C04324D75}" type="datetimeFigureOut">
               <a:rPr lang="zh-CN" altLang="en-US" smtClean="0"/>
-              <a:t>2022/12/30</a:t>
+              <a:t>2023/1/7</a:t>
             </a:fld>
             <a:endParaRPr lang="zh-CN" altLang="en-US"/>
           </a:p>
@@ -14563,7 +14563,7 @@
           <a:p>
             <a:fld id="{D997B5FA-0921-464F-AAE1-844C04324D75}" type="datetimeFigureOut">
               <a:rPr lang="zh-CN" altLang="en-US" smtClean="0"/>
-              <a:t>2022/12/30</a:t>
+              <a:t>2023/1/7</a:t>
             </a:fld>
             <a:endParaRPr lang="zh-CN" altLang="en-US"/>
           </a:p>
@@ -14922,7 +14922,7 @@
           <a:p>
             <a:fld id="{D997B5FA-0921-464F-AAE1-844C04324D75}" type="datetimeFigureOut">
               <a:rPr lang="zh-CN" altLang="en-US" smtClean="0"/>
-              <a:t>2022/12/30</a:t>
+              <a:t>2023/1/7</a:t>
             </a:fld>
             <a:endParaRPr lang="zh-CN" altLang="en-US"/>
           </a:p>
@@ -15034,7 +15034,7 @@
           <a:p>
             <a:fld id="{D997B5FA-0921-464F-AAE1-844C04324D75}" type="datetimeFigureOut">
               <a:rPr lang="zh-CN" altLang="en-US" smtClean="0"/>
-              <a:t>2022/12/30</a:t>
+              <a:t>2023/1/7</a:t>
             </a:fld>
             <a:endParaRPr lang="zh-CN" altLang="en-US"/>
           </a:p>
@@ -15124,7 +15124,7 @@
           <a:p>
             <a:fld id="{D997B5FA-0921-464F-AAE1-844C04324D75}" type="datetimeFigureOut">
               <a:rPr lang="zh-CN" altLang="en-US" smtClean="0"/>
-              <a:t>2022/12/30</a:t>
+              <a:t>2023/1/7</a:t>
             </a:fld>
             <a:endParaRPr lang="zh-CN" altLang="en-US"/>
           </a:p>
@@ -15394,7 +15394,7 @@
           <a:p>
             <a:fld id="{D997B5FA-0921-464F-AAE1-844C04324D75}" type="datetimeFigureOut">
               <a:rPr lang="zh-CN" altLang="en-US" smtClean="0"/>
-              <a:t>2022/12/30</a:t>
+              <a:t>2023/1/7</a:t>
             </a:fld>
             <a:endParaRPr lang="zh-CN" altLang="en-US"/>
           </a:p>
@@ -15641,7 +15641,7 @@
           <a:p>
             <a:fld id="{D997B5FA-0921-464F-AAE1-844C04324D75}" type="datetimeFigureOut">
               <a:rPr lang="zh-CN" altLang="en-US" smtClean="0"/>
-              <a:t>2022/12/30</a:t>
+              <a:t>2023/1/7</a:t>
             </a:fld>
             <a:endParaRPr lang="zh-CN" altLang="en-US"/>
           </a:p>
@@ -15847,7 +15847,7 @@
           <a:p>
             <a:fld id="{D997B5FA-0921-464F-AAE1-844C04324D75}" type="datetimeFigureOut">
               <a:rPr lang="zh-CN" altLang="en-US" smtClean="0"/>
-              <a:t>2022/12/30</a:t>
+              <a:t>2023/1/7</a:t>
             </a:fld>
             <a:endParaRPr lang="zh-CN" altLang="en-US"/>
           </a:p>
@@ -16394,7 +16394,7 @@
           <a:p>
             <a:fld id="{760FBDFE-C587-4B4C-A407-44438C67B59E}" type="datetimeFigureOut">
               <a:rPr lang="zh-CN" altLang="en-US" smtClean="0"/>
-              <a:t>2022/12/30</a:t>
+              <a:t>2023/1/7</a:t>
             </a:fld>
             <a:endParaRPr lang="zh-CN" altLang="en-US"/>
           </a:p>
@@ -17063,7 +17063,7 @@
                 <a:latin typeface="Consolas" panose="020B0609020204030204" charset="0"/>
                 <a:ea typeface="宋体" panose="02010600030101010101" pitchFamily="2" charset="-122"/>
               </a:rPr>
-              <a:t>#ifndef __GEOMETRY_H__</a:t>
+              <a:t>#ifndef _GEOMETRY_H_</a:t>
             </a:r>
           </a:p>
           <a:p>
@@ -17079,7 +17079,7 @@
                 <a:latin typeface="Consolas" panose="020B0609020204030204" charset="0"/>
                 <a:ea typeface="宋体" panose="02010600030101010101" pitchFamily="2" charset="-122"/>
               </a:rPr>
-              <a:t>#define __GEOMETRY_H__</a:t>
+              <a:t>#define _GEOMETRY_H_</a:t>
             </a:r>
             <a:endParaRPr lang="en-US" b="0">
               <a:solidFill>
@@ -18420,8 +18420,8 @@
         </p:nvSpPr>
         <p:spPr>
           <a:xfrm>
-            <a:off x="789305" y="2271395"/>
-            <a:ext cx="7774940" cy="2306955"/>
+            <a:off x="789304" y="2271395"/>
+            <a:ext cx="8094719" cy="2306955"/>
           </a:xfrm>
           <a:prstGeom prst="rect">
             <a:avLst/>

</xml_diff>